<commit_message>
underlining some code in the catch slide
</commit_message>
<xml_diff>
--- a/promises.pptx
+++ b/promises.pptx
@@ -304,7 +304,7 @@
           <a:p>
             <a:fld id="{0C096996-2D33-4F41-A338-9BAF7963D162}" type="datetimeFigureOut">
               <a:rPr lang="en-US" smtClean="0"/>
-              <a:t>8/7/2014</a:t>
+              <a:t>8/8/2014</a:t>
             </a:fld>
             <a:endParaRPr lang="en-US"/>
           </a:p>
@@ -474,7 +474,7 @@
           <a:p>
             <a:fld id="{0C096996-2D33-4F41-A338-9BAF7963D162}" type="datetimeFigureOut">
               <a:rPr lang="en-US" smtClean="0"/>
-              <a:t>8/7/2014</a:t>
+              <a:t>8/8/2014</a:t>
             </a:fld>
             <a:endParaRPr lang="en-US"/>
           </a:p>
@@ -654,7 +654,7 @@
           <a:p>
             <a:fld id="{0C096996-2D33-4F41-A338-9BAF7963D162}" type="datetimeFigureOut">
               <a:rPr lang="en-US" smtClean="0"/>
-              <a:t>8/7/2014</a:t>
+              <a:t>8/8/2014</a:t>
             </a:fld>
             <a:endParaRPr lang="en-US"/>
           </a:p>
@@ -824,7 +824,7 @@
           <a:p>
             <a:fld id="{0C096996-2D33-4F41-A338-9BAF7963D162}" type="datetimeFigureOut">
               <a:rPr lang="en-US" smtClean="0"/>
-              <a:t>8/7/2014</a:t>
+              <a:t>8/8/2014</a:t>
             </a:fld>
             <a:endParaRPr lang="en-US"/>
           </a:p>
@@ -1070,7 +1070,7 @@
           <a:p>
             <a:fld id="{0C096996-2D33-4F41-A338-9BAF7963D162}" type="datetimeFigureOut">
               <a:rPr lang="en-US" smtClean="0"/>
-              <a:t>8/7/2014</a:t>
+              <a:t>8/8/2014</a:t>
             </a:fld>
             <a:endParaRPr lang="en-US"/>
           </a:p>
@@ -1358,7 +1358,7 @@
           <a:p>
             <a:fld id="{0C096996-2D33-4F41-A338-9BAF7963D162}" type="datetimeFigureOut">
               <a:rPr lang="en-US" smtClean="0"/>
-              <a:t>8/7/2014</a:t>
+              <a:t>8/8/2014</a:t>
             </a:fld>
             <a:endParaRPr lang="en-US"/>
           </a:p>
@@ -1780,7 +1780,7 @@
           <a:p>
             <a:fld id="{0C096996-2D33-4F41-A338-9BAF7963D162}" type="datetimeFigureOut">
               <a:rPr lang="en-US" smtClean="0"/>
-              <a:t>8/7/2014</a:t>
+              <a:t>8/8/2014</a:t>
             </a:fld>
             <a:endParaRPr lang="en-US"/>
           </a:p>
@@ -1898,7 +1898,7 @@
           <a:p>
             <a:fld id="{0C096996-2D33-4F41-A338-9BAF7963D162}" type="datetimeFigureOut">
               <a:rPr lang="en-US" smtClean="0"/>
-              <a:t>8/7/2014</a:t>
+              <a:t>8/8/2014</a:t>
             </a:fld>
             <a:endParaRPr lang="en-US"/>
           </a:p>
@@ -1993,7 +1993,7 @@
           <a:p>
             <a:fld id="{0C096996-2D33-4F41-A338-9BAF7963D162}" type="datetimeFigureOut">
               <a:rPr lang="en-US" smtClean="0"/>
-              <a:t>8/7/2014</a:t>
+              <a:t>8/8/2014</a:t>
             </a:fld>
             <a:endParaRPr lang="en-US"/>
           </a:p>
@@ -2270,7 +2270,7 @@
           <a:p>
             <a:fld id="{0C096996-2D33-4F41-A338-9BAF7963D162}" type="datetimeFigureOut">
               <a:rPr lang="en-US" smtClean="0"/>
-              <a:t>8/7/2014</a:t>
+              <a:t>8/8/2014</a:t>
             </a:fld>
             <a:endParaRPr lang="en-US"/>
           </a:p>
@@ -2523,7 +2523,7 @@
           <a:p>
             <a:fld id="{0C096996-2D33-4F41-A338-9BAF7963D162}" type="datetimeFigureOut">
               <a:rPr lang="en-US" smtClean="0"/>
-              <a:t>8/7/2014</a:t>
+              <a:t>8/8/2014</a:t>
             </a:fld>
             <a:endParaRPr lang="en-US"/>
           </a:p>
@@ -2736,7 +2736,7 @@
           <a:p>
             <a:fld id="{0C096996-2D33-4F41-A338-9BAF7963D162}" type="datetimeFigureOut">
               <a:rPr lang="en-US" smtClean="0"/>
-              <a:t>8/7/2014</a:t>
+              <a:t>8/8/2014</a:t>
             </a:fld>
             <a:endParaRPr lang="en-US"/>
           </a:p>
@@ -5035,7 +5035,7 @@
         </p:blipFill>
         <p:spPr bwMode="auto">
           <a:xfrm>
-            <a:off x="228600" y="1828800"/>
+            <a:off x="228600" y="1800726"/>
             <a:ext cx="4544608" cy="3810000"/>
           </a:xfrm>
           <a:prstGeom prst="rect">
@@ -5120,86 +5120,120 @@
           </a:extLst>
         </p:spPr>
       </p:pic>
-      <p:sp>
-        <p:nvSpPr>
-          <p:cNvPr id="3" name="Right Arrow 2"/>
-          <p:cNvSpPr/>
+      <p:cxnSp>
+        <p:nvCxnSpPr>
+          <p:cNvPr id="7" name="Straight Connector 6"/>
+          <p:cNvCxnSpPr/>
           <p:nvPr/>
-        </p:nvSpPr>
+        </p:nvCxnSpPr>
         <p:spPr>
-          <a:xfrm rot="1959899">
-            <a:off x="161786" y="2701858"/>
-            <a:ext cx="461340" cy="169968"/>
+          <a:xfrm>
+            <a:off x="749968" y="3112168"/>
+            <a:ext cx="533400" cy="0"/>
           </a:xfrm>
-          <a:prstGeom prst="rightArrow">
+          <a:prstGeom prst="line">
             <a:avLst/>
           </a:prstGeom>
+          <a:effectLst>
+            <a:glow rad="38100">
+              <a:schemeClr val="accent5">
+                <a:satMod val="175000"/>
+                <a:alpha val="40000"/>
+              </a:schemeClr>
+            </a:glow>
+          </a:effectLst>
         </p:spPr>
         <p:style>
-          <a:lnRef idx="2">
-            <a:schemeClr val="accent1">
-              <a:shade val="50000"/>
-            </a:schemeClr>
+          <a:lnRef idx="1">
+            <a:schemeClr val="accent1"/>
           </a:lnRef>
-          <a:fillRef idx="1">
+          <a:fillRef idx="0">
             <a:schemeClr val="accent1"/>
           </a:fillRef>
           <a:effectRef idx="0">
             <a:schemeClr val="accent1"/>
           </a:effectRef>
           <a:fontRef idx="minor">
-            <a:schemeClr val="lt1"/>
+            <a:schemeClr val="tx1"/>
           </a:fontRef>
         </p:style>
-        <p:txBody>
-          <a:bodyPr rtlCol="0" anchor="ctr"/>
-          <a:lstStyle/>
-          <a:p>
-            <a:pPr algn="ctr"/>
-            <a:endParaRPr lang="en-US"/>
-          </a:p>
-        </p:txBody>
-      </p:sp>
-      <p:sp>
-        <p:nvSpPr>
-          <p:cNvPr id="6" name="Right Arrow 5"/>
-          <p:cNvSpPr/>
+      </p:cxnSp>
+      <p:cxnSp>
+        <p:nvCxnSpPr>
+          <p:cNvPr id="11" name="Straight Connector 10"/>
+          <p:cNvCxnSpPr/>
           <p:nvPr/>
-        </p:nvSpPr>
+        </p:nvCxnSpPr>
         <p:spPr>
-          <a:xfrm rot="1959899">
-            <a:off x="161786" y="4138574"/>
-            <a:ext cx="461340" cy="169968"/>
+          <a:xfrm>
+            <a:off x="743952" y="4525880"/>
+            <a:ext cx="533400" cy="0"/>
           </a:xfrm>
-          <a:prstGeom prst="rightArrow">
+          <a:prstGeom prst="line">
             <a:avLst/>
           </a:prstGeom>
+          <a:effectLst>
+            <a:glow rad="38100">
+              <a:schemeClr val="accent5">
+                <a:satMod val="175000"/>
+                <a:alpha val="40000"/>
+              </a:schemeClr>
+            </a:glow>
+          </a:effectLst>
         </p:spPr>
         <p:style>
-          <a:lnRef idx="2">
-            <a:schemeClr val="accent1">
-              <a:shade val="50000"/>
-            </a:schemeClr>
+          <a:lnRef idx="1">
+            <a:schemeClr val="accent1"/>
           </a:lnRef>
-          <a:fillRef idx="1">
+          <a:fillRef idx="0">
             <a:schemeClr val="accent1"/>
           </a:fillRef>
           <a:effectRef idx="0">
             <a:schemeClr val="accent1"/>
           </a:effectRef>
           <a:fontRef idx="minor">
-            <a:schemeClr val="lt1"/>
+            <a:schemeClr val="tx1"/>
           </a:fontRef>
         </p:style>
-        <p:txBody>
-          <a:bodyPr rtlCol="0" anchor="ctr"/>
-          <a:lstStyle/>
-          <a:p>
-            <a:pPr algn="ctr"/>
-            <a:endParaRPr lang="en-US"/>
-          </a:p>
-        </p:txBody>
-      </p:sp>
+      </p:cxnSp>
+      <p:cxnSp>
+        <p:nvCxnSpPr>
+          <p:cNvPr id="15" name="Straight Connector 14"/>
+          <p:cNvCxnSpPr/>
+          <p:nvPr/>
+        </p:nvCxnSpPr>
+        <p:spPr>
+          <a:xfrm>
+            <a:off x="477256" y="4068680"/>
+            <a:ext cx="152400" cy="0"/>
+          </a:xfrm>
+          <a:prstGeom prst="line">
+            <a:avLst/>
+          </a:prstGeom>
+          <a:effectLst>
+            <a:glow rad="38100">
+              <a:schemeClr val="accent5">
+                <a:satMod val="175000"/>
+                <a:alpha val="40000"/>
+              </a:schemeClr>
+            </a:glow>
+          </a:effectLst>
+        </p:spPr>
+        <p:style>
+          <a:lnRef idx="1">
+            <a:schemeClr val="accent1"/>
+          </a:lnRef>
+          <a:fillRef idx="0">
+            <a:schemeClr val="accent1"/>
+          </a:fillRef>
+          <a:effectRef idx="0">
+            <a:schemeClr val="accent1"/>
+          </a:effectRef>
+          <a:fontRef idx="minor">
+            <a:schemeClr val="tx1"/>
+          </a:fontRef>
+        </p:style>
+      </p:cxnSp>
     </p:spTree>
     <p:extLst>
       <p:ext uri="{BB962C8B-B14F-4D97-AF65-F5344CB8AC3E}">
@@ -5312,6 +5346,129 @@
                                         <p:cTn id="12" dur="500"/>
                                         <p:tgtEl>
                                           <p:spTgt spid="2051"/>
+                                        </p:tgtEl>
+                                      </p:cBhvr>
+                                    </p:animEffect>
+                                  </p:childTnLst>
+                                </p:cTn>
+                              </p:par>
+                            </p:childTnLst>
+                          </p:cTn>
+                        </p:par>
+                      </p:childTnLst>
+                    </p:cTn>
+                  </p:par>
+                  <p:par>
+                    <p:cTn id="13" fill="hold">
+                      <p:stCondLst>
+                        <p:cond delay="indefinite"/>
+                      </p:stCondLst>
+                      <p:childTnLst>
+                        <p:par>
+                          <p:cTn id="14" fill="hold">
+                            <p:stCondLst>
+                              <p:cond delay="0"/>
+                            </p:stCondLst>
+                            <p:childTnLst>
+                              <p:par>
+                                <p:cTn id="15" presetID="10" presetClass="entr" presetSubtype="0" fill="hold" nodeType="clickEffect">
+                                  <p:stCondLst>
+                                    <p:cond delay="0"/>
+                                  </p:stCondLst>
+                                  <p:childTnLst>
+                                    <p:set>
+                                      <p:cBhvr>
+                                        <p:cTn id="16" dur="1" fill="hold">
+                                          <p:stCondLst>
+                                            <p:cond delay="0"/>
+                                          </p:stCondLst>
+                                        </p:cTn>
+                                        <p:tgtEl>
+                                          <p:spTgt spid="7"/>
+                                        </p:tgtEl>
+                                        <p:attrNameLst>
+                                          <p:attrName>style.visibility</p:attrName>
+                                        </p:attrNameLst>
+                                      </p:cBhvr>
+                                      <p:to>
+                                        <p:strVal val="visible"/>
+                                      </p:to>
+                                    </p:set>
+                                    <p:animEffect transition="in" filter="fade">
+                                      <p:cBhvr>
+                                        <p:cTn id="17" dur="500"/>
+                                        <p:tgtEl>
+                                          <p:spTgt spid="7"/>
+                                        </p:tgtEl>
+                                      </p:cBhvr>
+                                    </p:animEffect>
+                                  </p:childTnLst>
+                                </p:cTn>
+                              </p:par>
+                              <p:par>
+                                <p:cTn id="18" presetID="10" presetClass="entr" presetSubtype="0" fill="hold" nodeType="withEffect">
+                                  <p:stCondLst>
+                                    <p:cond delay="0"/>
+                                  </p:stCondLst>
+                                  <p:childTnLst>
+                                    <p:set>
+                                      <p:cBhvr>
+                                        <p:cTn id="19" dur="1" fill="hold">
+                                          <p:stCondLst>
+                                            <p:cond delay="0"/>
+                                          </p:stCondLst>
+                                        </p:cTn>
+                                        <p:tgtEl>
+                                          <p:spTgt spid="15"/>
+                                        </p:tgtEl>
+                                        <p:attrNameLst>
+                                          <p:attrName>style.visibility</p:attrName>
+                                        </p:attrNameLst>
+                                      </p:cBhvr>
+                                      <p:to>
+                                        <p:strVal val="visible"/>
+                                      </p:to>
+                                    </p:set>
+                                    <p:animEffect transition="in" filter="fade">
+                                      <p:cBhvr>
+                                        <p:cTn id="20" dur="500"/>
+                                        <p:tgtEl>
+                                          <p:spTgt spid="15"/>
+                                        </p:tgtEl>
+                                      </p:cBhvr>
+                                    </p:animEffect>
+                                  </p:childTnLst>
+                                </p:cTn>
+                              </p:par>
+                              <p:par>
+                                <p:cTn id="21" presetID="10" presetClass="entr" presetSubtype="0" fill="hold" nodeType="withEffect">
+                                  <p:stCondLst>
+                                    <p:cond delay="0"/>
+                                  </p:stCondLst>
+                                  <p:childTnLst>
+                                    <p:set>
+                                      <p:cBhvr>
+                                        <p:cTn id="22" dur="1" fill="hold">
+                                          <p:stCondLst>
+                                            <p:cond delay="0"/>
+                                          </p:stCondLst>
+                                        </p:cTn>
+                                        <p:tgtEl>
+                                          <p:spTgt spid="11"/>
+                                        </p:tgtEl>
+                                        <p:attrNameLst>
+                                          <p:attrName>style.visibility</p:attrName>
+                                        </p:attrNameLst>
+                                      </p:cBhvr>
+                                      <p:to>
+                                        <p:strVal val="visible"/>
+                                      </p:to>
+                                    </p:set>
+                                    <p:animEffect transition="in" filter="fade">
+                                      <p:cBhvr>
+                                        <p:cTn id="23" dur="500"/>
+                                        <p:tgtEl>
+                                          <p:spTgt spid="11"/>
                                         </p:tgtEl>
                                       </p:cBhvr>
                                     </p:animEffect>

</xml_diff>